<commit_message>
Introduction to Mockito presentation updates
</commit_message>
<xml_diff>
--- a/presentations/Introduction to Mockito.pptx
+++ b/presentations/Introduction to Mockito.pptx
@@ -7,13 +7,14 @@
   <p:sldIdLst>
     <p:sldId id="256" r:id="rId2"/>
     <p:sldId id="257" r:id="rId3"/>
-    <p:sldId id="258" r:id="rId4"/>
-    <p:sldId id="259" r:id="rId5"/>
-    <p:sldId id="260" r:id="rId6"/>
-    <p:sldId id="261" r:id="rId7"/>
-    <p:sldId id="262" r:id="rId8"/>
-    <p:sldId id="263" r:id="rId9"/>
-    <p:sldId id="264" r:id="rId10"/>
+    <p:sldId id="265" r:id="rId4"/>
+    <p:sldId id="258" r:id="rId5"/>
+    <p:sldId id="259" r:id="rId6"/>
+    <p:sldId id="260" r:id="rId7"/>
+    <p:sldId id="261" r:id="rId8"/>
+    <p:sldId id="262" r:id="rId9"/>
+    <p:sldId id="263" r:id="rId10"/>
+    <p:sldId id="264" r:id="rId11"/>
   </p:sldIdLst>
   <p:sldSz cx="12192000" cy="6858000"/>
   <p:notesSz cx="6858000" cy="9144000"/>
@@ -267,7 +268,7 @@
           <a:p>
             <a:fld id="{B38EF465-D677-F140-82CD-891C0463380E}" type="datetimeFigureOut">
               <a:rPr lang="en-US" smtClean="0"/>
-              <a:t>8/8/21</a:t>
+              <a:t>10/18/21</a:t>
             </a:fld>
             <a:endParaRPr lang="en-US"/>
           </a:p>
@@ -465,7 +466,7 @@
           <a:p>
             <a:fld id="{B38EF465-D677-F140-82CD-891C0463380E}" type="datetimeFigureOut">
               <a:rPr lang="en-US" smtClean="0"/>
-              <a:t>8/8/21</a:t>
+              <a:t>10/18/21</a:t>
             </a:fld>
             <a:endParaRPr lang="en-US"/>
           </a:p>
@@ -673,7 +674,7 @@
           <a:p>
             <a:fld id="{B38EF465-D677-F140-82CD-891C0463380E}" type="datetimeFigureOut">
               <a:rPr lang="en-US" smtClean="0"/>
-              <a:t>8/8/21</a:t>
+              <a:t>10/18/21</a:t>
             </a:fld>
             <a:endParaRPr lang="en-US"/>
           </a:p>
@@ -871,7 +872,7 @@
           <a:p>
             <a:fld id="{B38EF465-D677-F140-82CD-891C0463380E}" type="datetimeFigureOut">
               <a:rPr lang="en-US" smtClean="0"/>
-              <a:t>8/8/21</a:t>
+              <a:t>10/18/21</a:t>
             </a:fld>
             <a:endParaRPr lang="en-US"/>
           </a:p>
@@ -1146,7 +1147,7 @@
           <a:p>
             <a:fld id="{B38EF465-D677-F140-82CD-891C0463380E}" type="datetimeFigureOut">
               <a:rPr lang="en-US" smtClean="0"/>
-              <a:t>8/8/21</a:t>
+              <a:t>10/18/21</a:t>
             </a:fld>
             <a:endParaRPr lang="en-US"/>
           </a:p>
@@ -1411,7 +1412,7 @@
           <a:p>
             <a:fld id="{B38EF465-D677-F140-82CD-891C0463380E}" type="datetimeFigureOut">
               <a:rPr lang="en-US" smtClean="0"/>
-              <a:t>8/8/21</a:t>
+              <a:t>10/18/21</a:t>
             </a:fld>
             <a:endParaRPr lang="en-US"/>
           </a:p>
@@ -1823,7 +1824,7 @@
           <a:p>
             <a:fld id="{B38EF465-D677-F140-82CD-891C0463380E}" type="datetimeFigureOut">
               <a:rPr lang="en-US" smtClean="0"/>
-              <a:t>8/8/21</a:t>
+              <a:t>10/18/21</a:t>
             </a:fld>
             <a:endParaRPr lang="en-US"/>
           </a:p>
@@ -1964,7 +1965,7 @@
           <a:p>
             <a:fld id="{B38EF465-D677-F140-82CD-891C0463380E}" type="datetimeFigureOut">
               <a:rPr lang="en-US" smtClean="0"/>
-              <a:t>8/8/21</a:t>
+              <a:t>10/18/21</a:t>
             </a:fld>
             <a:endParaRPr lang="en-US"/>
           </a:p>
@@ -2077,7 +2078,7 @@
           <a:p>
             <a:fld id="{B38EF465-D677-F140-82CD-891C0463380E}" type="datetimeFigureOut">
               <a:rPr lang="en-US" smtClean="0"/>
-              <a:t>8/8/21</a:t>
+              <a:t>10/18/21</a:t>
             </a:fld>
             <a:endParaRPr lang="en-US"/>
           </a:p>
@@ -2388,7 +2389,7 @@
           <a:p>
             <a:fld id="{B38EF465-D677-F140-82CD-891C0463380E}" type="datetimeFigureOut">
               <a:rPr lang="en-US" smtClean="0"/>
-              <a:t>8/8/21</a:t>
+              <a:t>10/18/21</a:t>
             </a:fld>
             <a:endParaRPr lang="en-US"/>
           </a:p>
@@ -2676,7 +2677,7 @@
           <a:p>
             <a:fld id="{B38EF465-D677-F140-82CD-891C0463380E}" type="datetimeFigureOut">
               <a:rPr lang="en-US" smtClean="0"/>
-              <a:t>8/8/21</a:t>
+              <a:t>10/18/21</a:t>
             </a:fld>
             <a:endParaRPr lang="en-US"/>
           </a:p>
@@ -2917,7 +2918,7 @@
           <a:p>
             <a:fld id="{B38EF465-D677-F140-82CD-891C0463380E}" type="datetimeFigureOut">
               <a:rPr lang="en-US" smtClean="0"/>
-              <a:t>8/8/21</a:t>
+              <a:t>10/18/21</a:t>
             </a:fld>
             <a:endParaRPr lang="en-US"/>
           </a:p>
@@ -3356,12 +3357,8 @@
           <a:lstStyle/>
           <a:p>
             <a:r>
-              <a:rPr lang="en-US"/>
-              <a:t>Mockito </a:t>
-            </a:r>
-            <a:r>
               <a:rPr lang="en-US" dirty="0"/>
-              <a:t>Framework</a:t>
+              <a:t>Introduction to Mockito</a:t>
             </a:r>
           </a:p>
         </p:txBody>
@@ -3398,6 +3395,86 @@
     <p:extLst>
       <p:ext uri="{BB962C8B-B14F-4D97-AF65-F5344CB8AC3E}">
         <p14:creationId xmlns:p14="http://schemas.microsoft.com/office/powerpoint/2010/main" val="162060597"/>
+      </p:ext>
+    </p:extLst>
+  </p:cSld>
+  <p:clrMapOvr>
+    <a:masterClrMapping/>
+  </p:clrMapOvr>
+</p:sld>
+</file>
+
+<file path=ppt/slides/slide10.xml><?xml version="1.0" encoding="utf-8"?>
+<p:sld xmlns:a="http://schemas.openxmlformats.org/drawingml/2006/main" xmlns:r="http://schemas.openxmlformats.org/officeDocument/2006/relationships" xmlns:p="http://schemas.openxmlformats.org/presentationml/2006/main">
+  <p:cSld>
+    <p:spTree>
+      <p:nvGrpSpPr>
+        <p:cNvPr id="1" name=""/>
+        <p:cNvGrpSpPr/>
+        <p:nvPr/>
+      </p:nvGrpSpPr>
+      <p:grpSpPr>
+        <a:xfrm>
+          <a:off x="0" y="0"/>
+          <a:ext cx="0" cy="0"/>
+          <a:chOff x="0" y="0"/>
+          <a:chExt cx="0" cy="0"/>
+        </a:xfrm>
+      </p:grpSpPr>
+      <p:sp>
+        <p:nvSpPr>
+          <p:cNvPr id="2" name="Title 1">
+            <a:extLst>
+              <a:ext uri="{FF2B5EF4-FFF2-40B4-BE49-F238E27FC236}">
+                <a16:creationId xmlns:a16="http://schemas.microsoft.com/office/drawing/2014/main" id="{EF948449-51E6-9148-82F6-455F26533FA8}"/>
+              </a:ext>
+            </a:extLst>
+          </p:cNvPr>
+          <p:cNvSpPr>
+            <a:spLocks noGrp="1"/>
+          </p:cNvSpPr>
+          <p:nvPr>
+            <p:ph type="title"/>
+          </p:nvPr>
+        </p:nvSpPr>
+        <p:spPr/>
+        <p:txBody>
+          <a:bodyPr/>
+          <a:lstStyle/>
+          <a:p>
+            <a:endParaRPr lang="en-US"/>
+          </a:p>
+        </p:txBody>
+      </p:sp>
+      <p:sp>
+        <p:nvSpPr>
+          <p:cNvPr id="3" name="Content Placeholder 2">
+            <a:extLst>
+              <a:ext uri="{FF2B5EF4-FFF2-40B4-BE49-F238E27FC236}">
+                <a16:creationId xmlns:a16="http://schemas.microsoft.com/office/drawing/2014/main" id="{813F127E-461D-714F-B0A3-A39A056EAE55}"/>
+              </a:ext>
+            </a:extLst>
+          </p:cNvPr>
+          <p:cNvSpPr>
+            <a:spLocks noGrp="1"/>
+          </p:cNvSpPr>
+          <p:nvPr>
+            <p:ph idx="1"/>
+          </p:nvPr>
+        </p:nvSpPr>
+        <p:spPr/>
+        <p:txBody>
+          <a:bodyPr/>
+          <a:lstStyle/>
+          <a:p>
+            <a:endParaRPr lang="en-US"/>
+          </a:p>
+        </p:txBody>
+      </p:sp>
+    </p:spTree>
+    <p:extLst>
+      <p:ext uri="{BB962C8B-B14F-4D97-AF65-F5344CB8AC3E}">
+        <p14:creationId xmlns:p14="http://schemas.microsoft.com/office/powerpoint/2010/main" val="3225130834"/>
       </p:ext>
     </p:extLst>
   </p:cSld>
@@ -3445,7 +3522,10 @@
           <a:bodyPr/>
           <a:lstStyle/>
           <a:p>
-            <a:endParaRPr lang="en-US"/>
+            <a:r>
+              <a:rPr lang="en-US" dirty="0"/>
+              <a:t>Why do we need Mockito?</a:t>
+            </a:r>
           </a:p>
         </p:txBody>
       </p:sp>
@@ -3470,7 +3550,41 @@
           <a:bodyPr/>
           <a:lstStyle/>
           <a:p>
-            <a:endParaRPr lang="en-US"/>
+            <a:r>
+              <a:rPr lang="en-US" dirty="0"/>
+              <a:t>Unit tests need to be isolated from slow dependencies: web services, databases, message queues, etc.</a:t>
+            </a:r>
+          </a:p>
+          <a:p>
+            <a:r>
+              <a:rPr lang="en-US" dirty="0"/>
+              <a:t>Mockito allows ask questions about interactions after execution of the SUT. </a:t>
+            </a:r>
+          </a:p>
+          <a:p>
+            <a:pPr lvl="1"/>
+            <a:r>
+              <a:rPr lang="en-US" dirty="0"/>
+              <a:t>Verify the interactions that you are interested in and ignore the irrelevant interactions.</a:t>
+            </a:r>
+          </a:p>
+          <a:p>
+            <a:r>
+              <a:rPr lang="en-US" dirty="0"/>
+              <a:t>Mockito mocks are often </a:t>
+            </a:r>
+            <a:r>
+              <a:rPr lang="en-US" i="1" dirty="0"/>
+              <a:t>ready</a:t>
+            </a:r>
+            <a:r>
+              <a:rPr lang="en-US" dirty="0"/>
+              <a:t> without expensive setup upfront.</a:t>
+            </a:r>
+          </a:p>
+          <a:p>
+            <a:pPr lvl="1"/>
+            <a:endParaRPr lang="en-US" dirty="0"/>
           </a:p>
         </p:txBody>
       </p:sp>
@@ -3509,7 +3623,7 @@
           <p:cNvPr id="2" name="Title 1">
             <a:extLst>
               <a:ext uri="{FF2B5EF4-FFF2-40B4-BE49-F238E27FC236}">
-                <a16:creationId xmlns:a16="http://schemas.microsoft.com/office/drawing/2014/main" id="{BDB22E06-8907-5D47-AEE0-EFE4022FF600}"/>
+                <a16:creationId xmlns:a16="http://schemas.microsoft.com/office/drawing/2014/main" id="{03B7E828-A870-554F-9976-8F0C60EF9A9D}"/>
               </a:ext>
             </a:extLst>
           </p:cNvPr>
@@ -3525,7 +3639,10 @@
           <a:bodyPr/>
           <a:lstStyle/>
           <a:p>
-            <a:endParaRPr lang="en-US"/>
+            <a:r>
+              <a:rPr lang="en-US" dirty="0"/>
+              <a:t>Mockito features</a:t>
+            </a:r>
           </a:p>
         </p:txBody>
       </p:sp>
@@ -3534,7 +3651,7 @@
           <p:cNvPr id="3" name="Content Placeholder 2">
             <a:extLst>
               <a:ext uri="{FF2B5EF4-FFF2-40B4-BE49-F238E27FC236}">
-                <a16:creationId xmlns:a16="http://schemas.microsoft.com/office/drawing/2014/main" id="{F51E78BE-4CA6-1A43-834B-CDBC31501506}"/>
+                <a16:creationId xmlns:a16="http://schemas.microsoft.com/office/drawing/2014/main" id="{24A416D8-A271-4E4D-9E69-4D5BBD0A500D}"/>
               </a:ext>
             </a:extLst>
           </p:cNvPr>
@@ -3547,17 +3664,97 @@
         </p:nvSpPr>
         <p:spPr/>
         <p:txBody>
-          <a:bodyPr/>
-          <a:lstStyle/>
-          <a:p>
-            <a:endParaRPr lang="en-US"/>
+          <a:bodyPr>
+            <a:normAutofit lnSpcReduction="10000"/>
+          </a:bodyPr>
+          <a:lstStyle/>
+          <a:p>
+            <a:r>
+              <a:rPr lang="en-US" dirty="0"/>
+              <a:t>Mocks concrete classes and interfaces.</a:t>
+            </a:r>
+          </a:p>
+          <a:p>
+            <a:r>
+              <a:rPr lang="en-US" dirty="0"/>
+              <a:t>Minimal annotation syntax sugar: @Mock.</a:t>
+            </a:r>
+          </a:p>
+          <a:p>
+            <a:r>
+              <a:rPr lang="en-US" dirty="0"/>
+              <a:t>Clean verification errors with stack traces that are hyperlinked to code in IDE. </a:t>
+            </a:r>
+          </a:p>
+          <a:p>
+            <a:r>
+              <a:rPr lang="en-US" dirty="0"/>
+              <a:t>Optional interaction verification and flexible with verification order.</a:t>
+            </a:r>
+          </a:p>
+          <a:p>
+            <a:r>
+              <a:rPr lang="en-US" dirty="0"/>
+              <a:t>Supports exact-number-of-times and at-least-once interaction verification.</a:t>
+            </a:r>
+          </a:p>
+          <a:p>
+            <a:r>
+              <a:rPr lang="en-US" dirty="0"/>
+              <a:t>Flexible argument matchers and custom argument matcher support. </a:t>
+            </a:r>
+          </a:p>
+          <a:p>
+            <a:pPr lvl="1"/>
+            <a:r>
+              <a:rPr lang="en-US" dirty="0" err="1"/>
+              <a:t>anyObject</a:t>
+            </a:r>
+            <a:r>
+              <a:rPr lang="en-US" dirty="0"/>
+              <a:t>(), </a:t>
+            </a:r>
+            <a:r>
+              <a:rPr lang="en-US" dirty="0" err="1"/>
+              <a:t>anyString</a:t>
+            </a:r>
+            <a:r>
+              <a:rPr lang="en-US" dirty="0"/>
+              <a:t>() or </a:t>
+            </a:r>
+            <a:r>
+              <a:rPr lang="en-US" dirty="0" err="1"/>
+              <a:t>refEq</a:t>
+            </a:r>
+            <a:r>
+              <a:rPr lang="en-US" dirty="0"/>
+              <a:t>() for reflection-based equality matching.</a:t>
+            </a:r>
+          </a:p>
+          <a:p>
+            <a:pPr lvl="1"/>
+            <a:r>
+              <a:rPr lang="en-US" dirty="0"/>
+              <a:t>Allows using existing </a:t>
+            </a:r>
+            <a:r>
+              <a:rPr lang="en-US" dirty="0" err="1"/>
+              <a:t>Hamcrest</a:t>
+            </a:r>
+            <a:r>
+              <a:rPr lang="en-US" dirty="0"/>
+              <a:t> matchers.</a:t>
+            </a:r>
+          </a:p>
+          <a:p>
+            <a:endParaRPr lang="en-US" dirty="0"/>
           </a:p>
         </p:txBody>
       </p:sp>
     </p:spTree>
     <p:extLst>
       <p:ext uri="{BB962C8B-B14F-4D97-AF65-F5344CB8AC3E}">
-        <p14:creationId xmlns:p14="http://schemas.microsoft.com/office/powerpoint/2010/main" val="690069578"/>
+        <p14:creationId xmlns:p14="http://schemas.microsoft.com/office/powerpoint/2010/main" val="105786952"/>
       </p:ext>
     </p:extLst>
   </p:cSld>
@@ -3589,7 +3786,7 @@
           <p:cNvPr id="2" name="Title 1">
             <a:extLst>
               <a:ext uri="{FF2B5EF4-FFF2-40B4-BE49-F238E27FC236}">
-                <a16:creationId xmlns:a16="http://schemas.microsoft.com/office/drawing/2014/main" id="{0ACB1337-375E-2245-A7F2-5ADAEF06D81E}"/>
+                <a16:creationId xmlns:a16="http://schemas.microsoft.com/office/drawing/2014/main" id="{BDB22E06-8907-5D47-AEE0-EFE4022FF600}"/>
               </a:ext>
             </a:extLst>
           </p:cNvPr>
@@ -3605,7 +3802,10 @@
           <a:bodyPr/>
           <a:lstStyle/>
           <a:p>
-            <a:endParaRPr lang="en-US"/>
+            <a:r>
+              <a:rPr lang="en-US" dirty="0"/>
+              <a:t>Test doubles supported by Mockito</a:t>
+            </a:r>
           </a:p>
         </p:txBody>
       </p:sp>
@@ -3614,7 +3814,7 @@
           <p:cNvPr id="3" name="Content Placeholder 2">
             <a:extLst>
               <a:ext uri="{FF2B5EF4-FFF2-40B4-BE49-F238E27FC236}">
-                <a16:creationId xmlns:a16="http://schemas.microsoft.com/office/drawing/2014/main" id="{01CB3B59-9643-F348-A490-6422BCB91D84}"/>
+                <a16:creationId xmlns:a16="http://schemas.microsoft.com/office/drawing/2014/main" id="{F51E78BE-4CA6-1A43-834B-CDBC31501506}"/>
               </a:ext>
             </a:extLst>
           </p:cNvPr>
@@ -3630,14 +3830,80 @@
           <a:bodyPr/>
           <a:lstStyle/>
           <a:p>
-            <a:endParaRPr lang="en-US"/>
+            <a:r>
+              <a:rPr lang="en-US" dirty="0"/>
+              <a:t>Stubs</a:t>
+            </a:r>
+          </a:p>
+          <a:p>
+            <a:pPr lvl="1"/>
+            <a:r>
+              <a:rPr lang="en-US" dirty="0"/>
+              <a:t>Stub before SUT execution.</a:t>
+            </a:r>
+          </a:p>
+          <a:p>
+            <a:pPr lvl="1"/>
+            <a:r>
+              <a:rPr lang="en-US" dirty="0"/>
+              <a:t>No interaction verification after SUT execution. </a:t>
+            </a:r>
+          </a:p>
+          <a:p>
+            <a:r>
+              <a:rPr lang="en-US" dirty="0"/>
+              <a:t>Mocks</a:t>
+            </a:r>
+          </a:p>
+          <a:p>
+            <a:pPr lvl="1"/>
+            <a:r>
+              <a:rPr lang="en-US" dirty="0"/>
+              <a:t>Stub before SUT execution. </a:t>
+            </a:r>
+          </a:p>
+          <a:p>
+            <a:pPr lvl="1"/>
+            <a:r>
+              <a:rPr lang="en-US" dirty="0"/>
+              <a:t>Verify the interaction after SUT execution.</a:t>
+            </a:r>
+          </a:p>
+          <a:p>
+            <a:r>
+              <a:rPr lang="en-US" dirty="0"/>
+              <a:t>Spies</a:t>
+            </a:r>
+          </a:p>
+          <a:p>
+            <a:pPr lvl="1"/>
+            <a:r>
+              <a:rPr lang="en-US" dirty="0"/>
+              <a:t>Allows implementing only the methods of interest and leave the rest abstract.</a:t>
+            </a:r>
+          </a:p>
+          <a:p>
+            <a:pPr lvl="1"/>
+            <a:r>
+              <a:rPr lang="en-US" dirty="0">
+                <a:hlinkClick r:id="rId2"/>
+              </a:rPr>
+              <a:t>https://github.com/mockito/mockito/wiki/Using-Spies-%28and-Fakes%29</a:t>
+            </a:r>
+            <a:endParaRPr lang="en-US" dirty="0"/>
+          </a:p>
+          <a:p>
+            <a:pPr marL="457200" lvl="1" indent="0">
+              <a:buNone/>
+            </a:pPr>
+            <a:endParaRPr lang="en-US" dirty="0"/>
           </a:p>
         </p:txBody>
       </p:sp>
     </p:spTree>
     <p:extLst>
       <p:ext uri="{BB962C8B-B14F-4D97-AF65-F5344CB8AC3E}">
-        <p14:creationId xmlns:p14="http://schemas.microsoft.com/office/powerpoint/2010/main" val="3431082857"/>
+        <p14:creationId xmlns:p14="http://schemas.microsoft.com/office/powerpoint/2010/main" val="690069578"/>
       </p:ext>
     </p:extLst>
   </p:cSld>
@@ -3669,7 +3935,7 @@
           <p:cNvPr id="2" name="Title 1">
             <a:extLst>
               <a:ext uri="{FF2B5EF4-FFF2-40B4-BE49-F238E27FC236}">
-                <a16:creationId xmlns:a16="http://schemas.microsoft.com/office/drawing/2014/main" id="{3D8AD980-BEFA-BA45-BA79-2E3EE8AA0ECF}"/>
+                <a16:creationId xmlns:a16="http://schemas.microsoft.com/office/drawing/2014/main" id="{0ACB1337-375E-2245-A7F2-5ADAEF06D81E}"/>
               </a:ext>
             </a:extLst>
           </p:cNvPr>
@@ -3694,7 +3960,7 @@
           <p:cNvPr id="3" name="Content Placeholder 2">
             <a:extLst>
               <a:ext uri="{FF2B5EF4-FFF2-40B4-BE49-F238E27FC236}">
-                <a16:creationId xmlns:a16="http://schemas.microsoft.com/office/drawing/2014/main" id="{EFC440CD-5D93-D246-BC4D-08A4EE439B45}"/>
+                <a16:creationId xmlns:a16="http://schemas.microsoft.com/office/drawing/2014/main" id="{01CB3B59-9643-F348-A490-6422BCB91D84}"/>
               </a:ext>
             </a:extLst>
           </p:cNvPr>
@@ -3717,7 +3983,7 @@
     </p:spTree>
     <p:extLst>
       <p:ext uri="{BB962C8B-B14F-4D97-AF65-F5344CB8AC3E}">
-        <p14:creationId xmlns:p14="http://schemas.microsoft.com/office/powerpoint/2010/main" val="3033223310"/>
+        <p14:creationId xmlns:p14="http://schemas.microsoft.com/office/powerpoint/2010/main" val="3431082857"/>
       </p:ext>
     </p:extLst>
   </p:cSld>
@@ -3749,7 +4015,7 @@
           <p:cNvPr id="2" name="Title 1">
             <a:extLst>
               <a:ext uri="{FF2B5EF4-FFF2-40B4-BE49-F238E27FC236}">
-                <a16:creationId xmlns:a16="http://schemas.microsoft.com/office/drawing/2014/main" id="{86C860B7-32F1-AE46-8944-4BDA7C647312}"/>
+                <a16:creationId xmlns:a16="http://schemas.microsoft.com/office/drawing/2014/main" id="{3D8AD980-BEFA-BA45-BA79-2E3EE8AA0ECF}"/>
               </a:ext>
             </a:extLst>
           </p:cNvPr>
@@ -3774,7 +4040,7 @@
           <p:cNvPr id="3" name="Content Placeholder 2">
             <a:extLst>
               <a:ext uri="{FF2B5EF4-FFF2-40B4-BE49-F238E27FC236}">
-                <a16:creationId xmlns:a16="http://schemas.microsoft.com/office/drawing/2014/main" id="{52E68A71-BC17-5D4F-BC93-8B7E374EBDDC}"/>
+                <a16:creationId xmlns:a16="http://schemas.microsoft.com/office/drawing/2014/main" id="{EFC440CD-5D93-D246-BC4D-08A4EE439B45}"/>
               </a:ext>
             </a:extLst>
           </p:cNvPr>
@@ -3797,7 +4063,7 @@
     </p:spTree>
     <p:extLst>
       <p:ext uri="{BB962C8B-B14F-4D97-AF65-F5344CB8AC3E}">
-        <p14:creationId xmlns:p14="http://schemas.microsoft.com/office/powerpoint/2010/main" val="3096622250"/>
+        <p14:creationId xmlns:p14="http://schemas.microsoft.com/office/powerpoint/2010/main" val="3033223310"/>
       </p:ext>
     </p:extLst>
   </p:cSld>
@@ -3829,7 +4095,7 @@
           <p:cNvPr id="2" name="Title 1">
             <a:extLst>
               <a:ext uri="{FF2B5EF4-FFF2-40B4-BE49-F238E27FC236}">
-                <a16:creationId xmlns:a16="http://schemas.microsoft.com/office/drawing/2014/main" id="{0721C84B-4C4A-C94C-8F18-7F1C16D2A1F4}"/>
+                <a16:creationId xmlns:a16="http://schemas.microsoft.com/office/drawing/2014/main" id="{86C860B7-32F1-AE46-8944-4BDA7C647312}"/>
               </a:ext>
             </a:extLst>
           </p:cNvPr>
@@ -3854,7 +4120,7 @@
           <p:cNvPr id="3" name="Content Placeholder 2">
             <a:extLst>
               <a:ext uri="{FF2B5EF4-FFF2-40B4-BE49-F238E27FC236}">
-                <a16:creationId xmlns:a16="http://schemas.microsoft.com/office/drawing/2014/main" id="{145FAC0A-9F40-C942-9675-DED9A8D58FF7}"/>
+                <a16:creationId xmlns:a16="http://schemas.microsoft.com/office/drawing/2014/main" id="{52E68A71-BC17-5D4F-BC93-8B7E374EBDDC}"/>
               </a:ext>
             </a:extLst>
           </p:cNvPr>
@@ -3877,7 +4143,7 @@
     </p:spTree>
     <p:extLst>
       <p:ext uri="{BB962C8B-B14F-4D97-AF65-F5344CB8AC3E}">
-        <p14:creationId xmlns:p14="http://schemas.microsoft.com/office/powerpoint/2010/main" val="3851587936"/>
+        <p14:creationId xmlns:p14="http://schemas.microsoft.com/office/powerpoint/2010/main" val="3096622250"/>
       </p:ext>
     </p:extLst>
   </p:cSld>
@@ -3909,7 +4175,7 @@
           <p:cNvPr id="2" name="Title 1">
             <a:extLst>
               <a:ext uri="{FF2B5EF4-FFF2-40B4-BE49-F238E27FC236}">
-                <a16:creationId xmlns:a16="http://schemas.microsoft.com/office/drawing/2014/main" id="{0CAD8607-3D0E-F34C-A71C-E1FCD84847DA}"/>
+                <a16:creationId xmlns:a16="http://schemas.microsoft.com/office/drawing/2014/main" id="{0721C84B-4C4A-C94C-8F18-7F1C16D2A1F4}"/>
               </a:ext>
             </a:extLst>
           </p:cNvPr>
@@ -3934,7 +4200,7 @@
           <p:cNvPr id="3" name="Content Placeholder 2">
             <a:extLst>
               <a:ext uri="{FF2B5EF4-FFF2-40B4-BE49-F238E27FC236}">
-                <a16:creationId xmlns:a16="http://schemas.microsoft.com/office/drawing/2014/main" id="{3C783A4D-ADD3-FE47-A802-7E1E33980728}"/>
+                <a16:creationId xmlns:a16="http://schemas.microsoft.com/office/drawing/2014/main" id="{145FAC0A-9F40-C942-9675-DED9A8D58FF7}"/>
               </a:ext>
             </a:extLst>
           </p:cNvPr>
@@ -3957,7 +4223,7 @@
     </p:spTree>
     <p:extLst>
       <p:ext uri="{BB962C8B-B14F-4D97-AF65-F5344CB8AC3E}">
-        <p14:creationId xmlns:p14="http://schemas.microsoft.com/office/powerpoint/2010/main" val="1482911797"/>
+        <p14:creationId xmlns:p14="http://schemas.microsoft.com/office/powerpoint/2010/main" val="3851587936"/>
       </p:ext>
     </p:extLst>
   </p:cSld>
@@ -3989,7 +4255,7 @@
           <p:cNvPr id="2" name="Title 1">
             <a:extLst>
               <a:ext uri="{FF2B5EF4-FFF2-40B4-BE49-F238E27FC236}">
-                <a16:creationId xmlns:a16="http://schemas.microsoft.com/office/drawing/2014/main" id="{EF948449-51E6-9148-82F6-455F26533FA8}"/>
+                <a16:creationId xmlns:a16="http://schemas.microsoft.com/office/drawing/2014/main" id="{0CAD8607-3D0E-F34C-A71C-E1FCD84847DA}"/>
               </a:ext>
             </a:extLst>
           </p:cNvPr>
@@ -4014,7 +4280,7 @@
           <p:cNvPr id="3" name="Content Placeholder 2">
             <a:extLst>
               <a:ext uri="{FF2B5EF4-FFF2-40B4-BE49-F238E27FC236}">
-                <a16:creationId xmlns:a16="http://schemas.microsoft.com/office/drawing/2014/main" id="{813F127E-461D-714F-B0A3-A39A056EAE55}"/>
+                <a16:creationId xmlns:a16="http://schemas.microsoft.com/office/drawing/2014/main" id="{3C783A4D-ADD3-FE47-A802-7E1E33980728}"/>
               </a:ext>
             </a:extLst>
           </p:cNvPr>
@@ -4037,7 +4303,7 @@
     </p:spTree>
     <p:extLst>
       <p:ext uri="{BB962C8B-B14F-4D97-AF65-F5344CB8AC3E}">
-        <p14:creationId xmlns:p14="http://schemas.microsoft.com/office/powerpoint/2010/main" val="3225130834"/>
+        <p14:creationId xmlns:p14="http://schemas.microsoft.com/office/powerpoint/2010/main" val="1482911797"/>
       </p:ext>
     </p:extLst>
   </p:cSld>

</xml_diff>

<commit_message>
Created void method stubbing example
</commit_message>
<xml_diff>
--- a/presentations/Introduction to Mockito.pptx
+++ b/presentations/Introduction to Mockito.pptx
@@ -283,7 +283,7 @@
           <a:p>
             <a:fld id="{B38EF465-D677-F140-82CD-891C0463380E}" type="datetimeFigureOut">
               <a:rPr lang="en-US" smtClean="0"/>
-              <a:t>10/18/21</a:t>
+              <a:t>10/24/21</a:t>
             </a:fld>
             <a:endParaRPr lang="en-US"/>
           </a:p>
@@ -481,7 +481,7 @@
           <a:p>
             <a:fld id="{B38EF465-D677-F140-82CD-891C0463380E}" type="datetimeFigureOut">
               <a:rPr lang="en-US" smtClean="0"/>
-              <a:t>10/18/21</a:t>
+              <a:t>10/24/21</a:t>
             </a:fld>
             <a:endParaRPr lang="en-US"/>
           </a:p>
@@ -689,7 +689,7 @@
           <a:p>
             <a:fld id="{B38EF465-D677-F140-82CD-891C0463380E}" type="datetimeFigureOut">
               <a:rPr lang="en-US" smtClean="0"/>
-              <a:t>10/18/21</a:t>
+              <a:t>10/24/21</a:t>
             </a:fld>
             <a:endParaRPr lang="en-US"/>
           </a:p>
@@ -887,7 +887,7 @@
           <a:p>
             <a:fld id="{B38EF465-D677-F140-82CD-891C0463380E}" type="datetimeFigureOut">
               <a:rPr lang="en-US" smtClean="0"/>
-              <a:t>10/18/21</a:t>
+              <a:t>10/24/21</a:t>
             </a:fld>
             <a:endParaRPr lang="en-US"/>
           </a:p>
@@ -1162,7 +1162,7 @@
           <a:p>
             <a:fld id="{B38EF465-D677-F140-82CD-891C0463380E}" type="datetimeFigureOut">
               <a:rPr lang="en-US" smtClean="0"/>
-              <a:t>10/18/21</a:t>
+              <a:t>10/24/21</a:t>
             </a:fld>
             <a:endParaRPr lang="en-US"/>
           </a:p>
@@ -1427,7 +1427,7 @@
           <a:p>
             <a:fld id="{B38EF465-D677-F140-82CD-891C0463380E}" type="datetimeFigureOut">
               <a:rPr lang="en-US" smtClean="0"/>
-              <a:t>10/18/21</a:t>
+              <a:t>10/24/21</a:t>
             </a:fld>
             <a:endParaRPr lang="en-US"/>
           </a:p>
@@ -1839,7 +1839,7 @@
           <a:p>
             <a:fld id="{B38EF465-D677-F140-82CD-891C0463380E}" type="datetimeFigureOut">
               <a:rPr lang="en-US" smtClean="0"/>
-              <a:t>10/18/21</a:t>
+              <a:t>10/24/21</a:t>
             </a:fld>
             <a:endParaRPr lang="en-US"/>
           </a:p>
@@ -1980,7 +1980,7 @@
           <a:p>
             <a:fld id="{B38EF465-D677-F140-82CD-891C0463380E}" type="datetimeFigureOut">
               <a:rPr lang="en-US" smtClean="0"/>
-              <a:t>10/18/21</a:t>
+              <a:t>10/24/21</a:t>
             </a:fld>
             <a:endParaRPr lang="en-US"/>
           </a:p>
@@ -2093,7 +2093,7 @@
           <a:p>
             <a:fld id="{B38EF465-D677-F140-82CD-891C0463380E}" type="datetimeFigureOut">
               <a:rPr lang="en-US" smtClean="0"/>
-              <a:t>10/18/21</a:t>
+              <a:t>10/24/21</a:t>
             </a:fld>
             <a:endParaRPr lang="en-US"/>
           </a:p>
@@ -2404,7 +2404,7 @@
           <a:p>
             <a:fld id="{B38EF465-D677-F140-82CD-891C0463380E}" type="datetimeFigureOut">
               <a:rPr lang="en-US" smtClean="0"/>
-              <a:t>10/18/21</a:t>
+              <a:t>10/24/21</a:t>
             </a:fld>
             <a:endParaRPr lang="en-US"/>
           </a:p>
@@ -2692,7 +2692,7 @@
           <a:p>
             <a:fld id="{B38EF465-D677-F140-82CD-891C0463380E}" type="datetimeFigureOut">
               <a:rPr lang="en-US" smtClean="0"/>
-              <a:t>10/18/21</a:t>
+              <a:t>10/24/21</a:t>
             </a:fld>
             <a:endParaRPr lang="en-US"/>
           </a:p>
@@ -2933,7 +2933,7 @@
           <a:p>
             <a:fld id="{B38EF465-D677-F140-82CD-891C0463380E}" type="datetimeFigureOut">
               <a:rPr lang="en-US" smtClean="0"/>
-              <a:t>10/18/21</a:t>
+              <a:t>10/24/21</a:t>
             </a:fld>
             <a:endParaRPr lang="en-US"/>
           </a:p>
@@ -6098,7 +6098,7 @@
         <p:spPr/>
         <p:txBody>
           <a:bodyPr>
-            <a:normAutofit lnSpcReduction="10000"/>
+            <a:normAutofit fontScale="92500"/>
           </a:bodyPr>
           <a:lstStyle/>
           <a:p>
@@ -6110,7 +6110,17 @@
           <a:p>
             <a:r>
               <a:rPr lang="en-US" dirty="0"/>
-              <a:t>Minimal annotation syntax sugar: @Mock.</a:t>
+              <a:t>Minimal annotation syntax sugar: </a:t>
+            </a:r>
+            <a:r>
+              <a:rPr lang="en-US" dirty="0">
+                <a:latin typeface="Courier" pitchFamily="2" charset="0"/>
+              </a:rPr>
+              <a:t>@Mock</a:t>
+            </a:r>
+            <a:r>
+              <a:rPr lang="en-US" dirty="0"/>
+              <a:t>.</a:t>
             </a:r>
           </a:p>
           <a:p>
@@ -6140,28 +6150,52 @@
           <a:p>
             <a:pPr lvl="1"/>
             <a:r>
-              <a:rPr lang="en-US" dirty="0" err="1"/>
+              <a:rPr lang="en-US" dirty="0" err="1">
+                <a:latin typeface="Courier" pitchFamily="2" charset="0"/>
+              </a:rPr>
               <a:t>anyObject</a:t>
             </a:r>
             <a:r>
-              <a:rPr lang="en-US" dirty="0"/>
-              <a:t>(), </a:t>
-            </a:r>
-            <a:r>
-              <a:rPr lang="en-US" dirty="0" err="1"/>
+              <a:rPr lang="en-US" dirty="0">
+                <a:latin typeface="Courier" pitchFamily="2" charset="0"/>
+              </a:rPr>
+              <a:t>()</a:t>
+            </a:r>
+            <a:r>
+              <a:rPr lang="en-US" dirty="0"/>
+              <a:t>, </a:t>
+            </a:r>
+            <a:r>
+              <a:rPr lang="en-US" dirty="0" err="1">
+                <a:latin typeface="Courier" pitchFamily="2" charset="0"/>
+              </a:rPr>
               <a:t>anyString</a:t>
             </a:r>
             <a:r>
-              <a:rPr lang="en-US" dirty="0"/>
-              <a:t>() or </a:t>
-            </a:r>
-            <a:r>
-              <a:rPr lang="en-US" dirty="0" err="1"/>
+              <a:rPr lang="en-US" dirty="0">
+                <a:latin typeface="Courier" pitchFamily="2" charset="0"/>
+              </a:rPr>
+              <a:t>()</a:t>
+            </a:r>
+            <a:r>
+              <a:rPr lang="en-US" dirty="0"/>
+              <a:t> or </a:t>
+            </a:r>
+            <a:r>
+              <a:rPr lang="en-US" dirty="0" err="1">
+                <a:latin typeface="Courier" pitchFamily="2" charset="0"/>
+              </a:rPr>
               <a:t>refEq</a:t>
             </a:r>
             <a:r>
-              <a:rPr lang="en-US" dirty="0"/>
-              <a:t>() for reflection-based equality matching.</a:t>
+              <a:rPr lang="en-US" dirty="0">
+                <a:latin typeface="Courier" pitchFamily="2" charset="0"/>
+              </a:rPr>
+              <a:t>()</a:t>
+            </a:r>
+            <a:r>
+              <a:rPr lang="en-US" dirty="0"/>
+              <a:t> for reflection-based equality matching.</a:t>
             </a:r>
           </a:p>
           <a:p>

</xml_diff>